<commit_message>
Enhance java files parsing & project presentation
</commit_message>
<xml_diff>
--- a/materials/Project Presentation.pptx
+++ b/materials/Project Presentation.pptx
@@ -6,7 +6,7 @@
     <p:sldMasterId id="2147483656" r:id="rId2"/>
   </p:sldMasterIdLst>
   <p:notesMasterIdLst>
-    <p:notesMasterId r:id="rId29"/>
+    <p:notesMasterId r:id="rId31"/>
   </p:notesMasterIdLst>
   <p:sldIdLst>
     <p:sldId id="314" r:id="rId3"/>
@@ -33,8 +33,10 @@
     <p:sldId id="352" r:id="rId24"/>
     <p:sldId id="357" r:id="rId25"/>
     <p:sldId id="293" r:id="rId26"/>
-    <p:sldId id="315" r:id="rId27"/>
-    <p:sldId id="354" r:id="rId28"/>
+    <p:sldId id="361" r:id="rId27"/>
+    <p:sldId id="362" r:id="rId28"/>
+    <p:sldId id="315" r:id="rId29"/>
+    <p:sldId id="354" r:id="rId30"/>
   </p:sldIdLst>
   <p:sldSz cx="9144000" cy="6858000" type="screen4x3"/>
   <p:notesSz cx="6858000" cy="9144000"/>
@@ -228,6 +230,7 @@
           </a:p>
         </c:rich>
       </c:tx>
+      <c:layout/>
       <c:overlay val="0"/>
       <c:spPr>
         <a:noFill/>
@@ -302,12 +305,13 @@
           <c:dLbls>
             <c:dLbl>
               <c:idx val="0"/>
+              <c:layout/>
               <c:tx>
                 <c:rich>
                   <a:bodyPr/>
                   <a:lstStyle/>
                   <a:p>
-                    <a:fld id="{7B6AEA6C-616F-4DCD-9AA4-866036D603CA}" type="CELLRANGE">
+                    <a:fld id="{36FD0E26-1F59-4BED-8762-4A1C69BFA300}" type="CELLRANGE">
                       <a:rPr lang="en-US"/>
                       <a:pPr/>
                       <a:t>[CELLRANGE]</a:t>
@@ -324,6 +328,7 @@
               <c:showBubbleSize val="0"/>
               <c:extLst>
                 <c:ext xmlns:c15="http://schemas.microsoft.com/office/drawing/2012/chart" uri="{CE6537A1-D6FC-4f65-9D91-7224C49458BB}">
+                  <c15:layout/>
                   <c15:dlblFieldTable/>
                   <c15:xForSave val="1"/>
                   <c15:showDataLabelsRange val="1"/>
@@ -332,12 +337,13 @@
             </c:dLbl>
             <c:dLbl>
               <c:idx val="1"/>
+              <c:layout/>
               <c:tx>
                 <c:rich>
                   <a:bodyPr/>
                   <a:lstStyle/>
                   <a:p>
-                    <a:fld id="{7FBE09C9-4C94-4577-BF5B-7E79AF22422D}" type="CELLRANGE">
+                    <a:fld id="{DBCEBA1B-AB94-45D5-BCEB-992183145878}" type="CELLRANGE">
                       <a:rPr lang="en-US"/>
                       <a:pPr/>
                       <a:t>[CELLRANGE]</a:t>
@@ -354,6 +360,7 @@
               <c:showBubbleSize val="0"/>
               <c:extLst>
                 <c:ext xmlns:c15="http://schemas.microsoft.com/office/drawing/2012/chart" uri="{CE6537A1-D6FC-4f65-9D91-7224C49458BB}">
+                  <c15:layout/>
                   <c15:dlblFieldTable/>
                   <c15:xForSave val="1"/>
                   <c15:showDataLabelsRange val="1"/>
@@ -362,12 +369,13 @@
             </c:dLbl>
             <c:dLbl>
               <c:idx val="2"/>
+              <c:layout/>
               <c:tx>
                 <c:rich>
                   <a:bodyPr/>
                   <a:lstStyle/>
                   <a:p>
-                    <a:fld id="{7994C23A-E811-472C-A330-B6698AFB322B}" type="CELLRANGE">
+                    <a:fld id="{02D55058-B9DF-42B2-8CCA-134FD69B4E86}" type="CELLRANGE">
                       <a:rPr lang="en-US"/>
                       <a:pPr/>
                       <a:t>[CELLRANGE]</a:t>
@@ -384,6 +392,7 @@
               <c:showBubbleSize val="0"/>
               <c:extLst>
                 <c:ext xmlns:c15="http://schemas.microsoft.com/office/drawing/2012/chart" uri="{CE6537A1-D6FC-4f65-9D91-7224C49458BB}">
+                  <c15:layout/>
                   <c15:dlblFieldTable/>
                   <c15:xForSave val="1"/>
                   <c15:showDataLabelsRange val="1"/>
@@ -392,12 +401,13 @@
             </c:dLbl>
             <c:dLbl>
               <c:idx val="3"/>
+              <c:layout/>
               <c:tx>
                 <c:rich>
                   <a:bodyPr/>
                   <a:lstStyle/>
                   <a:p>
-                    <a:fld id="{E26DA3CC-E80E-447A-9061-CA82F61BDD27}" type="CELLRANGE">
+                    <a:fld id="{D0F78137-12D4-41D9-B41E-B892043D82DC}" type="CELLRANGE">
                       <a:rPr lang="en-US"/>
                       <a:pPr/>
                       <a:t>[CELLRANGE]</a:t>
@@ -414,6 +424,7 @@
               <c:showBubbleSize val="0"/>
               <c:extLst>
                 <c:ext xmlns:c15="http://schemas.microsoft.com/office/drawing/2012/chart" uri="{CE6537A1-D6FC-4f65-9D91-7224C49458BB}">
+                  <c15:layout/>
                   <c15:dlblFieldTable/>
                   <c15:xForSave val="1"/>
                   <c15:showDataLabelsRange val="1"/>
@@ -422,12 +433,13 @@
             </c:dLbl>
             <c:dLbl>
               <c:idx val="4"/>
+              <c:layout/>
               <c:tx>
                 <c:rich>
                   <a:bodyPr/>
                   <a:lstStyle/>
                   <a:p>
-                    <a:fld id="{69A7C1CB-0845-437C-9CCA-99F501B89783}" type="CELLRANGE">
+                    <a:fld id="{7BD4EE39-868B-47DE-9942-055AE1237DB8}" type="CELLRANGE">
                       <a:rPr lang="en-US"/>
                       <a:pPr/>
                       <a:t>[CELLRANGE]</a:t>
@@ -444,6 +456,7 @@
               <c:showBubbleSize val="0"/>
               <c:extLst>
                 <c:ext xmlns:c15="http://schemas.microsoft.com/office/drawing/2012/chart" uri="{CE6537A1-D6FC-4f65-9D91-7224C49458BB}">
+                  <c15:layout/>
                   <c15:dlblFieldTable/>
                   <c15:xForSave val="1"/>
                   <c15:showDataLabelsRange val="1"/>
@@ -452,12 +465,13 @@
             </c:dLbl>
             <c:dLbl>
               <c:idx val="5"/>
+              <c:layout/>
               <c:tx>
                 <c:rich>
                   <a:bodyPr/>
                   <a:lstStyle/>
                   <a:p>
-                    <a:fld id="{BA058F17-4904-489A-B660-3C84632DAEDB}" type="CELLRANGE">
+                    <a:fld id="{98BF7248-8F12-4A76-B733-8DA0A4E72BF4}" type="CELLRANGE">
                       <a:rPr lang="en-US"/>
                       <a:pPr/>
                       <a:t>[CELLRANGE]</a:t>
@@ -474,6 +488,7 @@
               <c:showBubbleSize val="0"/>
               <c:extLst>
                 <c:ext xmlns:c15="http://schemas.microsoft.com/office/drawing/2012/chart" uri="{CE6537A1-D6FC-4f65-9D91-7224C49458BB}">
+                  <c15:layout/>
                   <c15:dlblFieldTable/>
                   <c15:xForSave val="1"/>
                   <c15:showDataLabelsRange val="1"/>
@@ -482,12 +497,13 @@
             </c:dLbl>
             <c:dLbl>
               <c:idx val="6"/>
+              <c:layout/>
               <c:tx>
                 <c:rich>
                   <a:bodyPr/>
                   <a:lstStyle/>
                   <a:p>
-                    <a:fld id="{02A94BE4-109A-4F3A-9319-66EC6D57B2F8}" type="CELLRANGE">
+                    <a:fld id="{C31648BF-18EF-4BBC-913A-11317DF82DAF}" type="CELLRANGE">
                       <a:rPr lang="en-US"/>
                       <a:pPr/>
                       <a:t>[CELLRANGE]</a:t>
@@ -504,6 +520,7 @@
               <c:showBubbleSize val="0"/>
               <c:extLst>
                 <c:ext xmlns:c15="http://schemas.microsoft.com/office/drawing/2012/chart" uri="{CE6537A1-D6FC-4f65-9D91-7224C49458BB}">
+                  <c15:layout/>
                   <c15:dlblFieldTable/>
                   <c15:xForSave val="1"/>
                   <c15:showDataLabelsRange val="1"/>
@@ -512,12 +529,13 @@
             </c:dLbl>
             <c:dLbl>
               <c:idx val="7"/>
+              <c:layout/>
               <c:tx>
                 <c:rich>
                   <a:bodyPr/>
                   <a:lstStyle/>
                   <a:p>
-                    <a:fld id="{68D83AEF-D267-4456-95A6-C63F6B673F0F}" type="CELLRANGE">
+                    <a:fld id="{5F772FCF-425E-4DA4-AADF-2CD130741C45}" type="CELLRANGE">
                       <a:rPr lang="en-US"/>
                       <a:pPr/>
                       <a:t>[CELLRANGE]</a:t>
@@ -534,6 +552,7 @@
               <c:showBubbleSize val="0"/>
               <c:extLst>
                 <c:ext xmlns:c15="http://schemas.microsoft.com/office/drawing/2012/chart" uri="{CE6537A1-D6FC-4f65-9D91-7224C49458BB}">
+                  <c15:layout/>
                   <c15:dlblFieldTable/>
                   <c15:xForSave val="1"/>
                   <c15:showDataLabelsRange val="1"/>
@@ -578,6 +597,7 @@
             <c:showLeaderLines val="0"/>
             <c:extLst>
               <c:ext xmlns:c15="http://schemas.microsoft.com/office/drawing/2012/chart" uri="{CE6537A1-D6FC-4f65-9D91-7224C49458BB}">
+                <c15:layout/>
                 <c15:showDataLabelsRange val="1"/>
                 <c15:showLeaderLines val="1"/>
                 <c15:leaderLines>
@@ -707,11 +727,11 @@
           <c:showPercent val="0"/>
           <c:showBubbleSize val="0"/>
         </c:dLbls>
-        <c:axId val="2086434544"/>
-        <c:axId val="2086436176"/>
+        <c:axId val="319021344"/>
+        <c:axId val="319026784"/>
       </c:scatterChart>
       <c:valAx>
-        <c:axId val="2086434544"/>
+        <c:axId val="319021344"/>
         <c:scaling>
           <c:orientation val="minMax"/>
         </c:scaling>
@@ -768,12 +788,12 @@
             <a:endParaRPr lang="en-US"/>
           </a:p>
         </c:txPr>
-        <c:crossAx val="2086436176"/>
+        <c:crossAx val="319026784"/>
         <c:crosses val="autoZero"/>
         <c:crossBetween val="midCat"/>
       </c:valAx>
       <c:valAx>
-        <c:axId val="2086436176"/>
+        <c:axId val="319026784"/>
         <c:scaling>
           <c:orientation val="minMax"/>
         </c:scaling>
@@ -830,7 +850,7 @@
             <a:endParaRPr lang="en-US"/>
           </a:p>
         </c:txPr>
-        <c:crossAx val="2086434544"/>
+        <c:crossAx val="319021344"/>
         <c:crosses val="autoZero"/>
         <c:crossBetween val="midCat"/>
       </c:valAx>
@@ -12422,7 +12442,6 @@
               <a:rPr lang="en-US" altLang="zh-CN" sz="1600" dirty="0" smtClean="0"/>
               <a:t>):</a:t>
             </a:r>
-            <a:endParaRPr lang="en-US" altLang="zh-CN" sz="1600" dirty="0" smtClean="0"/>
           </a:p>
           <a:p>
             <a:pPr marL="0" indent="0" algn="just">
@@ -21769,108 +21788,13 @@
             </a:pPr>
             <a:r>
               <a:rPr lang="en-US" altLang="en-US" sz="1600" dirty="0" smtClean="0"/>
-              <a:t>   68% True positives, which is high, even compared to manually created patterns classifiers</a:t>
-            </a:r>
-          </a:p>
-          <a:p>
-            <a:pPr marL="522288" lvl="1" indent="0" eaLnBrk="1" hangingPunct="1">
-              <a:buFont typeface="Wingdings" panose="05000000000000000000" pitchFamily="2" charset="2"/>
-              <a:buChar char="Ø"/>
-              <a:tabLst>
-                <a:tab pos="444500" algn="l"/>
-              </a:tabLst>
-            </a:pPr>
+              <a:t>   68% True positives, which is high, even compared to manually created patterns </a:t>
+            </a:r>
             <a:r>
               <a:rPr lang="en-US" altLang="en-US" sz="1600" dirty="0" smtClean="0"/>
-              <a:t>Used state of the art multiprocessing to calculate </a:t>
-            </a:r>
-            <a:r>
-              <a:rPr lang="en-US" altLang="en-US" sz="1600" dirty="0" err="1" smtClean="0"/>
-              <a:t>git</a:t>
-            </a:r>
-            <a:r>
-              <a:rPr lang="en-US" altLang="en-US" sz="1600" dirty="0" smtClean="0"/>
-              <a:t> repos statistics</a:t>
-            </a:r>
-          </a:p>
-          <a:p>
-            <a:pPr marL="522288" lvl="1" indent="0" eaLnBrk="1" hangingPunct="1">
-              <a:buFont typeface="Wingdings" panose="05000000000000000000" pitchFamily="2" charset="2"/>
-              <a:buChar char="Ø"/>
-              <a:tabLst>
-                <a:tab pos="444500" algn="l"/>
-              </a:tabLst>
-            </a:pPr>
-            <a:r>
-              <a:rPr lang="en-US" altLang="zh-CN" sz="1600" dirty="0" smtClean="0"/>
-              <a:t>Used </a:t>
-            </a:r>
-            <a:r>
-              <a:rPr lang="en-US" altLang="zh-CN" sz="1600" dirty="0" err="1" smtClean="0"/>
-              <a:t>Git</a:t>
-            </a:r>
-            <a:r>
-              <a:rPr lang="en-US" altLang="zh-CN" sz="1600" dirty="0" smtClean="0"/>
-              <a:t> API: up to 5000 requests per day</a:t>
-            </a:r>
-          </a:p>
-          <a:p>
-            <a:pPr marL="522288" lvl="1" indent="0" eaLnBrk="1" hangingPunct="1">
-              <a:buFont typeface="Wingdings" panose="05000000000000000000" pitchFamily="2" charset="2"/>
-              <a:buChar char="Ø"/>
-              <a:tabLst>
-                <a:tab pos="444500" algn="l"/>
-              </a:tabLst>
-            </a:pPr>
-            <a:r>
-              <a:rPr lang="en-US" altLang="zh-CN" sz="1600" dirty="0" smtClean="0"/>
-              <a:t>Found unique correlation between repo volatility and overall code quality</a:t>
-            </a:r>
-          </a:p>
-          <a:p>
-            <a:pPr marL="522288" lvl="1" indent="0" eaLnBrk="1" hangingPunct="1">
-              <a:buFont typeface="Wingdings" panose="05000000000000000000" pitchFamily="2" charset="2"/>
-              <a:buChar char="Ø"/>
-              <a:tabLst>
-                <a:tab pos="444500" algn="l"/>
-              </a:tabLst>
-            </a:pPr>
-            <a:r>
-              <a:rPr lang="en-US" altLang="zh-CN" sz="1600" dirty="0" smtClean="0"/>
-              <a:t>Researched various </a:t>
-            </a:r>
-            <a:r>
-              <a:rPr lang="en-US" altLang="zh-CN" sz="1600" dirty="0" err="1" smtClean="0"/>
-              <a:t>git</a:t>
-            </a:r>
-            <a:r>
-              <a:rPr lang="en-US" altLang="zh-CN" sz="1600" dirty="0" smtClean="0"/>
-              <a:t> output formats to reuse in feature projects</a:t>
-            </a:r>
-          </a:p>
-          <a:p>
-            <a:pPr marL="522288" lvl="1" indent="0" eaLnBrk="1" hangingPunct="1">
-              <a:buFont typeface="Wingdings" panose="05000000000000000000" pitchFamily="2" charset="2"/>
-              <a:buChar char="Ø"/>
-              <a:tabLst>
-                <a:tab pos="444500" algn="l"/>
-              </a:tabLst>
-            </a:pPr>
-            <a:r>
-              <a:rPr lang="en-US" altLang="zh-CN" sz="1600" dirty="0" smtClean="0"/>
-              <a:t>Distributable python package created, ready to run on Ubuntu/Windows as executable shell command (</a:t>
-            </a:r>
-            <a:r>
-              <a:rPr lang="en-US" altLang="zh-CN" sz="1600" dirty="0" smtClean="0">
-                <a:hlinkClick r:id="rId2"/>
-              </a:rPr>
-              <a:t>https://test.pypi.org/project/volatility-zuoqin/0.0.4/</a:t>
-            </a:r>
-            <a:r>
-              <a:rPr lang="en-US" altLang="en-US" sz="1400" dirty="0" smtClean="0"/>
-              <a:t>)</a:t>
-            </a:r>
-            <a:endParaRPr lang="en-US" altLang="zh-CN" sz="1300" dirty="0" smtClean="0"/>
+              <a:t>classifiers</a:t>
+            </a:r>
+            <a:endParaRPr lang="en-US" altLang="en-US" sz="1600" dirty="0" smtClean="0"/>
           </a:p>
         </p:txBody>
       </p:sp>
@@ -21906,7 +21830,377 @@
           <a:chExt cx="0" cy="0"/>
         </a:xfrm>
       </p:grpSpPr>
+      <p:sp>
+        <p:nvSpPr>
+          <p:cNvPr id="17410" name="Date Placeholder 3"/>
+          <p:cNvSpPr>
+            <a:spLocks noGrp="1"/>
+          </p:cNvSpPr>
+          <p:nvPr>
+            <p:ph type="dt" sz="quarter" idx="10"/>
+          </p:nvPr>
+        </p:nvSpPr>
+        <p:spPr>
+          <a:noFill/>
+          <a:ln/>
+          <a:extLst>
+            <a:ext uri="{909E8E84-426E-40DD-AFC4-6F175D3DCCD1}">
+              <a14:hiddenFill xmlns:a14="http://schemas.microsoft.com/office/drawing/2010/main">
+                <a:solidFill>
+                  <a:srgbClr val="FFFFFF"/>
+                </a:solidFill>
+              </a14:hiddenFill>
+            </a:ext>
+            <a:ext uri="{91240B29-F687-4F45-9708-019B960494DF}">
+              <a14:hiddenLine xmlns:a14="http://schemas.microsoft.com/office/drawing/2010/main" w="9525">
+                <a:solidFill>
+                  <a:srgbClr val="000000"/>
+                </a:solidFill>
+                <a:miter lim="800000"/>
+                <a:headEnd/>
+                <a:tailEnd/>
+              </a14:hiddenLine>
+            </a:ext>
+          </a:extLst>
+        </p:spPr>
+        <p:txBody>
+          <a:bodyPr/>
+          <a:lstStyle>
+            <a:lvl1pPr defTabSz="784225">
+              <a:lnSpc>
+                <a:spcPct val="120000"/>
+              </a:lnSpc>
+              <a:spcBef>
+                <a:spcPct val="20000"/>
+              </a:spcBef>
+              <a:spcAft>
+                <a:spcPct val="20000"/>
+              </a:spcAft>
+              <a:buClr>
+                <a:srgbClr val="990000"/>
+              </a:buClr>
+              <a:buSzPct val="85000"/>
+              <a:buFont typeface="Wingdings" panose="05000000000000000000" pitchFamily="2" charset="2"/>
+              <a:buChar char="l"/>
+              <a:defRPr sz="1700">
+                <a:solidFill>
+                  <a:schemeClr val="tx1"/>
+                </a:solidFill>
+                <a:latin typeface="FrutigerNext LT Medium" pitchFamily="34" charset="0"/>
+                <a:ea typeface="宋体" panose="02010600030101010101" pitchFamily="2" charset="-122"/>
+              </a:defRPr>
+            </a:lvl1pPr>
+            <a:lvl2pPr marL="742950" indent="-285750" defTabSz="784225">
+              <a:lnSpc>
+                <a:spcPct val="120000"/>
+              </a:lnSpc>
+              <a:spcBef>
+                <a:spcPct val="20000"/>
+              </a:spcBef>
+              <a:spcAft>
+                <a:spcPct val="20000"/>
+              </a:spcAft>
+              <a:buClr>
+                <a:srgbClr val="5F5F5F"/>
+              </a:buClr>
+              <a:buFont typeface="Wingdings 3" panose="05040102010807070707" pitchFamily="18" charset="2"/>
+              <a:buChar char="["/>
+              <a:defRPr sz="1700">
+                <a:solidFill>
+                  <a:schemeClr val="tx1"/>
+                </a:solidFill>
+                <a:latin typeface="FrutigerNext LT Medium" pitchFamily="34" charset="0"/>
+                <a:ea typeface="宋体" panose="02010600030101010101" pitchFamily="2" charset="-122"/>
+              </a:defRPr>
+            </a:lvl2pPr>
+            <a:lvl3pPr marL="1143000" indent="-228600" defTabSz="784225">
+              <a:lnSpc>
+                <a:spcPct val="120000"/>
+              </a:lnSpc>
+              <a:spcBef>
+                <a:spcPct val="20000"/>
+              </a:spcBef>
+              <a:spcAft>
+                <a:spcPct val="20000"/>
+              </a:spcAft>
+              <a:buClr>
+                <a:schemeClr val="tx1"/>
+              </a:buClr>
+              <a:buFont typeface="Arial" panose="020B0604020202020204" pitchFamily="34" charset="0"/>
+              <a:buChar char="−"/>
+              <a:defRPr sz="1700">
+                <a:solidFill>
+                  <a:schemeClr val="tx1"/>
+                </a:solidFill>
+                <a:latin typeface="FrutigerNext LT Medium" pitchFamily="34" charset="0"/>
+                <a:ea typeface="宋体" panose="02010600030101010101" pitchFamily="2" charset="-122"/>
+              </a:defRPr>
+            </a:lvl3pPr>
+            <a:lvl4pPr marL="1600200" indent="-228600" defTabSz="784225">
+              <a:lnSpc>
+                <a:spcPct val="120000"/>
+              </a:lnSpc>
+              <a:spcBef>
+                <a:spcPct val="20000"/>
+              </a:spcBef>
+              <a:spcAft>
+                <a:spcPct val="20000"/>
+              </a:spcAft>
+              <a:buClr>
+                <a:schemeClr val="tx1"/>
+              </a:buClr>
+              <a:buFont typeface="Arial" panose="020B0604020202020204" pitchFamily="34" charset="0"/>
+              <a:buChar char="▪"/>
+              <a:defRPr sz="1700">
+                <a:solidFill>
+                  <a:schemeClr val="tx1"/>
+                </a:solidFill>
+                <a:latin typeface="FrutigerNext LT Medium" pitchFamily="34" charset="0"/>
+                <a:ea typeface="宋体" panose="02010600030101010101" pitchFamily="2" charset="-122"/>
+              </a:defRPr>
+            </a:lvl4pPr>
+            <a:lvl5pPr marL="2057400" indent="-228600" defTabSz="784225">
+              <a:spcBef>
+                <a:spcPct val="20000"/>
+              </a:spcBef>
+              <a:buChar char="»"/>
+              <a:defRPr sz="1700">
+                <a:solidFill>
+                  <a:schemeClr val="tx1"/>
+                </a:solidFill>
+                <a:latin typeface="Arial" panose="020B0604020202020204" pitchFamily="34" charset="0"/>
+                <a:ea typeface="宋体" panose="02010600030101010101" pitchFamily="2" charset="-122"/>
+              </a:defRPr>
+            </a:lvl5pPr>
+            <a:lvl6pPr marL="2514600" indent="-228600" defTabSz="784225" eaLnBrk="0" fontAlgn="base" hangingPunct="0">
+              <a:spcBef>
+                <a:spcPct val="20000"/>
+              </a:spcBef>
+              <a:spcAft>
+                <a:spcPct val="0"/>
+              </a:spcAft>
+              <a:buChar char="»"/>
+              <a:defRPr sz="1700">
+                <a:solidFill>
+                  <a:schemeClr val="tx1"/>
+                </a:solidFill>
+                <a:latin typeface="Arial" panose="020B0604020202020204" pitchFamily="34" charset="0"/>
+                <a:ea typeface="宋体" panose="02010600030101010101" pitchFamily="2" charset="-122"/>
+              </a:defRPr>
+            </a:lvl6pPr>
+            <a:lvl7pPr marL="2971800" indent="-228600" defTabSz="784225" eaLnBrk="0" fontAlgn="base" hangingPunct="0">
+              <a:spcBef>
+                <a:spcPct val="20000"/>
+              </a:spcBef>
+              <a:spcAft>
+                <a:spcPct val="0"/>
+              </a:spcAft>
+              <a:buChar char="»"/>
+              <a:defRPr sz="1700">
+                <a:solidFill>
+                  <a:schemeClr val="tx1"/>
+                </a:solidFill>
+                <a:latin typeface="Arial" panose="020B0604020202020204" pitchFamily="34" charset="0"/>
+                <a:ea typeface="宋体" panose="02010600030101010101" pitchFamily="2" charset="-122"/>
+              </a:defRPr>
+            </a:lvl7pPr>
+            <a:lvl8pPr marL="3429000" indent="-228600" defTabSz="784225" eaLnBrk="0" fontAlgn="base" hangingPunct="0">
+              <a:spcBef>
+                <a:spcPct val="20000"/>
+              </a:spcBef>
+              <a:spcAft>
+                <a:spcPct val="0"/>
+              </a:spcAft>
+              <a:buChar char="»"/>
+              <a:defRPr sz="1700">
+                <a:solidFill>
+                  <a:schemeClr val="tx1"/>
+                </a:solidFill>
+                <a:latin typeface="Arial" panose="020B0604020202020204" pitchFamily="34" charset="0"/>
+                <a:ea typeface="宋体" panose="02010600030101010101" pitchFamily="2" charset="-122"/>
+              </a:defRPr>
+            </a:lvl8pPr>
+            <a:lvl9pPr marL="3886200" indent="-228600" defTabSz="784225" eaLnBrk="0" fontAlgn="base" hangingPunct="0">
+              <a:spcBef>
+                <a:spcPct val="20000"/>
+              </a:spcBef>
+              <a:spcAft>
+                <a:spcPct val="0"/>
+              </a:spcAft>
+              <a:buChar char="»"/>
+              <a:defRPr sz="1700">
+                <a:solidFill>
+                  <a:schemeClr val="tx1"/>
+                </a:solidFill>
+                <a:latin typeface="Arial" panose="020B0604020202020204" pitchFamily="34" charset="0"/>
+                <a:ea typeface="宋体" panose="02010600030101010101" pitchFamily="2" charset="-122"/>
+              </a:defRPr>
+            </a:lvl9pPr>
+          </a:lstStyle>
+          <a:p>
+            <a:pPr>
+              <a:lnSpc>
+                <a:spcPct val="85000"/>
+              </a:lnSpc>
+              <a:spcBef>
+                <a:spcPct val="0"/>
+              </a:spcBef>
+              <a:spcAft>
+                <a:spcPct val="0"/>
+              </a:spcAft>
+              <a:buClrTx/>
+              <a:buSzTx/>
+              <a:buFontTx/>
+              <a:buNone/>
+            </a:pPr>
+            <a:endParaRPr lang="de-DE" altLang="en-US" sz="1000" smtClean="0">
+              <a:ea typeface="MS PGothic" panose="020B0600070205080204" pitchFamily="34" charset="-128"/>
+            </a:endParaRPr>
+          </a:p>
+          <a:p>
+            <a:pPr>
+              <a:lnSpc>
+                <a:spcPct val="85000"/>
+              </a:lnSpc>
+              <a:spcBef>
+                <a:spcPct val="0"/>
+              </a:spcBef>
+              <a:spcAft>
+                <a:spcPct val="0"/>
+              </a:spcAft>
+              <a:buClrTx/>
+              <a:buSzTx/>
+              <a:buFontTx/>
+              <a:buNone/>
+            </a:pPr>
+            <a:r>
+              <a:rPr lang="de-DE" altLang="en-US" sz="1000" smtClean="0">
+                <a:ea typeface="MS PGothic" panose="020B0600070205080204" pitchFamily="34" charset="-128"/>
+              </a:rPr>
+              <a:t>Page </a:t>
+            </a:r>
+            <a:fld id="{8DC6A97E-2057-4D78-A7C7-ACEC89E1A461}" type="slidenum">
+              <a:rPr lang="de-DE" altLang="en-US" sz="1000" smtClean="0">
+                <a:ea typeface="MS PGothic" panose="020B0600070205080204" pitchFamily="34" charset="-128"/>
+              </a:rPr>
+              <a:pPr>
+                <a:lnSpc>
+                  <a:spcPct val="85000"/>
+                </a:lnSpc>
+                <a:spcBef>
+                  <a:spcPct val="0"/>
+                </a:spcBef>
+                <a:spcAft>
+                  <a:spcPct val="0"/>
+                </a:spcAft>
+                <a:buClrTx/>
+                <a:buSzTx/>
+                <a:buFontTx/>
+                <a:buNone/>
+              </a:pPr>
+              <a:t>25</a:t>
+            </a:fld>
+            <a:r>
+              <a:rPr lang="ru-RU" altLang="en-US" sz="1000" smtClean="0">
+                <a:ea typeface="MS PGothic" panose="020B0600070205080204" pitchFamily="34" charset="-128"/>
+              </a:rPr>
+              <a:t>/1</a:t>
+            </a:r>
+            <a:r>
+              <a:rPr lang="en-US" altLang="en-US" sz="1000" smtClean="0">
+                <a:ea typeface="MS PGothic" panose="020B0600070205080204" pitchFamily="34" charset="-128"/>
+              </a:rPr>
+              <a:t>3</a:t>
+            </a:r>
+            <a:endParaRPr lang="en-GB" altLang="en-US" sz="1000" smtClean="0">
+              <a:ea typeface="MS PGothic" panose="020B0600070205080204" pitchFamily="34" charset="-128"/>
+            </a:endParaRPr>
+          </a:p>
+        </p:txBody>
+      </p:sp>
+      <p:sp>
+        <p:nvSpPr>
+          <p:cNvPr id="17411" name="Rectangle 2"/>
+          <p:cNvSpPr>
+            <a:spLocks noGrp="1" noChangeArrowheads="1"/>
+          </p:cNvSpPr>
+          <p:nvPr>
+            <p:ph type="title"/>
+          </p:nvPr>
+        </p:nvSpPr>
+        <p:spPr>
+          <a:xfrm>
+            <a:off x="28575" y="12700"/>
+            <a:ext cx="9115425" cy="720725"/>
+          </a:xfrm>
+        </p:spPr>
+        <p:txBody>
+          <a:bodyPr/>
+          <a:lstStyle/>
+          <a:p>
+            <a:pPr algn="ctr" eaLnBrk="1" hangingPunct="1">
+              <a:defRPr/>
+            </a:pPr>
+            <a:r>
+              <a:rPr lang="en-US" altLang="zh-CN" sz="3200" dirty="0" smtClean="0"/>
+              <a:t>Further extension</a:t>
+            </a:r>
+            <a:endParaRPr lang="en-US" altLang="zh-CN" sz="2000" dirty="0" smtClean="0">
+              <a:solidFill>
+                <a:schemeClr val="tx1">
+                  <a:lumMod val="75000"/>
+                  <a:lumOff val="25000"/>
+                </a:schemeClr>
+              </a:solidFill>
+            </a:endParaRPr>
+          </a:p>
+        </p:txBody>
+      </p:sp>
+      <p:sp>
+        <p:nvSpPr>
+          <p:cNvPr id="17412" name="Rectangle 3"/>
+          <p:cNvSpPr>
+            <a:spLocks noGrp="1" noChangeArrowheads="1"/>
+          </p:cNvSpPr>
+          <p:nvPr>
+            <p:ph type="body" idx="1"/>
+          </p:nvPr>
+        </p:nvSpPr>
+        <p:spPr>
+          <a:xfrm>
+            <a:off x="685800" y="1266825"/>
+            <a:ext cx="8001000" cy="2314575"/>
+          </a:xfrm>
+        </p:spPr>
+        <p:txBody>
+          <a:bodyPr/>
+          <a:lstStyle/>
+          <a:p>
+            <a:pPr marL="522288" lvl="1" indent="0" eaLnBrk="1" hangingPunct="1">
+              <a:buFont typeface="Wingdings" panose="05000000000000000000" pitchFamily="2" charset="2"/>
+              <a:buChar char="Ø"/>
+              <a:tabLst>
+                <a:tab pos="444500" algn="l"/>
+              </a:tabLst>
+            </a:pPr>
+            <a:r>
+              <a:rPr lang="en-US" altLang="en-US" sz="1600" dirty="0" smtClean="0"/>
+              <a:t>   </a:t>
+            </a:r>
+            <a:r>
+              <a:rPr lang="en-US" altLang="en-US" sz="1600" dirty="0" smtClean="0"/>
+              <a:t>Bug localization on million of files</a:t>
+            </a:r>
+            <a:endParaRPr lang="en-US" altLang="en-US" sz="1600" dirty="0" smtClean="0"/>
+          </a:p>
+        </p:txBody>
+      </p:sp>
     </p:spTree>
+    <p:extLst>
+      <p:ext uri="{BB962C8B-B14F-4D97-AF65-F5344CB8AC3E}">
+        <p14:creationId xmlns:p14="http://schemas.microsoft.com/office/powerpoint/2010/main" val="2993831855"/>
+      </p:ext>
+    </p:extLst>
   </p:cSld>
   <p:clrMapOvr>
     <a:masterClrMapping/>
@@ -21958,6 +22252,715 @@
         </p:nvSpPr>
         <p:spPr>
           <a:xfrm>
+            <a:off x="0" y="6212"/>
+            <a:ext cx="9144000" cy="630237"/>
+          </a:xfrm>
+        </p:spPr>
+        <p:txBody>
+          <a:bodyPr/>
+          <a:lstStyle/>
+          <a:p>
+            <a:pPr algn="ctr"/>
+            <a:r>
+              <a:rPr lang="en-US" altLang="zh-CN" sz="3200" dirty="0" smtClean="0"/>
+              <a:t>Motivation</a:t>
+            </a:r>
+            <a:endParaRPr lang="zh-CN" altLang="en-US" sz="2000" dirty="0" smtClean="0"/>
+          </a:p>
+        </p:txBody>
+      </p:sp>
+      <p:sp>
+        <p:nvSpPr>
+          <p:cNvPr id="11267" name="Rectangle 3"/>
+          <p:cNvSpPr>
+            <a:spLocks noGrp="1" noChangeArrowheads="1"/>
+          </p:cNvSpPr>
+          <p:nvPr>
+            <p:ph type="body" sz="half" idx="1"/>
+          </p:nvPr>
+        </p:nvSpPr>
+        <p:spPr>
+          <a:xfrm>
+            <a:off x="609599" y="685800"/>
+            <a:ext cx="8177213" cy="5334000"/>
+          </a:xfrm>
+        </p:spPr>
+        <p:txBody>
+          <a:bodyPr/>
+          <a:lstStyle/>
+          <a:p>
+            <a:pPr marL="0" indent="0" algn="just">
+              <a:lnSpc>
+                <a:spcPct val="115000"/>
+              </a:lnSpc>
+              <a:buNone/>
+            </a:pPr>
+            <a:endParaRPr lang="en-US" altLang="zh-CN" sz="1600" dirty="0"/>
+          </a:p>
+          <a:p>
+            <a:pPr marL="0" indent="0" algn="just">
+              <a:lnSpc>
+                <a:spcPct val="115000"/>
+              </a:lnSpc>
+              <a:buNone/>
+            </a:pPr>
+            <a:endParaRPr lang="en-US" altLang="zh-CN" sz="1600" dirty="0" smtClean="0"/>
+          </a:p>
+          <a:p>
+            <a:pPr marL="231775" indent="-231775" algn="just">
+              <a:lnSpc>
+                <a:spcPct val="115000"/>
+              </a:lnSpc>
+              <a:buFont typeface="Wingdings" pitchFamily="2" charset="2"/>
+              <a:buNone/>
+            </a:pPr>
+            <a:endParaRPr lang="en-US" altLang="zh-CN" dirty="0" smtClean="0"/>
+          </a:p>
+          <a:p>
+            <a:pPr marL="231775" indent="-231775" algn="just">
+              <a:lnSpc>
+                <a:spcPct val="115000"/>
+              </a:lnSpc>
+              <a:buFont typeface="Wingdings" pitchFamily="2" charset="2"/>
+              <a:buNone/>
+            </a:pPr>
+            <a:endParaRPr lang="en-US" altLang="zh-CN" dirty="0"/>
+          </a:p>
+          <a:p>
+            <a:pPr marL="231775" indent="-231775" algn="just">
+              <a:lnSpc>
+                <a:spcPct val="115000"/>
+              </a:lnSpc>
+              <a:buFont typeface="Wingdings" pitchFamily="2" charset="2"/>
+              <a:buNone/>
+            </a:pPr>
+            <a:r>
+              <a:rPr lang="en-US" altLang="zh-CN" sz="2000" dirty="0" smtClean="0"/>
+              <a:t>Relevancy</a:t>
+            </a:r>
+            <a:r>
+              <a:rPr lang="en-US" altLang="zh-CN" dirty="0" smtClean="0"/>
+              <a:t>:</a:t>
+            </a:r>
+          </a:p>
+          <a:p>
+            <a:pPr algn="just">
+              <a:lnSpc>
+                <a:spcPct val="115000"/>
+              </a:lnSpc>
+            </a:pPr>
+            <a:r>
+              <a:rPr lang="en-US" altLang="zh-CN" dirty="0" smtClean="0"/>
+              <a:t>Finding the right team or developer</a:t>
+            </a:r>
+          </a:p>
+          <a:p>
+            <a:pPr algn="just">
+              <a:lnSpc>
+                <a:spcPct val="115000"/>
+              </a:lnSpc>
+            </a:pPr>
+            <a:r>
+              <a:rPr lang="en-US" altLang="zh-CN" dirty="0" smtClean="0"/>
+              <a:t>Giving the developer a starting point</a:t>
+            </a:r>
+          </a:p>
+          <a:p>
+            <a:pPr algn="just">
+              <a:lnSpc>
+                <a:spcPct val="115000"/>
+              </a:lnSpc>
+            </a:pPr>
+            <a:r>
+              <a:rPr lang="en-US" altLang="zh-CN" dirty="0" smtClean="0"/>
+              <a:t>Enabling automated program repair</a:t>
+            </a:r>
+          </a:p>
+          <a:p>
+            <a:pPr algn="just">
+              <a:lnSpc>
+                <a:spcPct val="115000"/>
+              </a:lnSpc>
+            </a:pPr>
+            <a:endParaRPr lang="en-US" altLang="zh-CN" dirty="0"/>
+          </a:p>
+          <a:p>
+            <a:pPr marL="0" indent="0" algn="just">
+              <a:lnSpc>
+                <a:spcPct val="115000"/>
+              </a:lnSpc>
+              <a:buNone/>
+            </a:pPr>
+            <a:r>
+              <a:rPr lang="en-US" altLang="zh-CN" dirty="0" smtClean="0"/>
+              <a:t>Input: raw crash trace</a:t>
+            </a:r>
+          </a:p>
+          <a:p>
+            <a:pPr marL="0" indent="0" algn="just">
+              <a:lnSpc>
+                <a:spcPct val="115000"/>
+              </a:lnSpc>
+              <a:buNone/>
+            </a:pPr>
+            <a:r>
+              <a:rPr lang="en-US" altLang="zh-CN" dirty="0" smtClean="0"/>
+              <a:t>Output</a:t>
+            </a:r>
+            <a:r>
+              <a:rPr lang="en-US" altLang="zh-CN" smtClean="0"/>
+              <a:t>: file(s) </a:t>
+            </a:r>
+            <a:r>
+              <a:rPr lang="en-US" altLang="zh-CN" dirty="0" smtClean="0"/>
+              <a:t>where to fix </a:t>
+            </a:r>
+            <a:r>
+              <a:rPr lang="en-US" altLang="zh-CN" smtClean="0"/>
+              <a:t>the bug</a:t>
+            </a:r>
+            <a:endParaRPr lang="en-US" altLang="zh-CN" dirty="0" smtClean="0"/>
+          </a:p>
+        </p:txBody>
+      </p:sp>
+      <p:sp>
+        <p:nvSpPr>
+          <p:cNvPr id="11268" name="Date Placeholder 4"/>
+          <p:cNvSpPr>
+            <a:spLocks noGrp="1"/>
+          </p:cNvSpPr>
+          <p:nvPr>
+            <p:ph type="dt" sz="quarter" idx="10"/>
+          </p:nvPr>
+        </p:nvSpPr>
+        <p:spPr>
+          <a:noFill/>
+          <a:ln/>
+          <a:extLst>
+            <a:ext uri="{909E8E84-426E-40DD-AFC4-6F175D3DCCD1}">
+              <a14:hiddenFill xmlns:a14="http://schemas.microsoft.com/office/drawing/2010/main">
+                <a:solidFill>
+                  <a:srgbClr val="FFFFFF"/>
+                </a:solidFill>
+              </a14:hiddenFill>
+            </a:ext>
+            <a:ext uri="{91240B29-F687-4F45-9708-019B960494DF}">
+              <a14:hiddenLine xmlns:a14="http://schemas.microsoft.com/office/drawing/2010/main" w="9525">
+                <a:solidFill>
+                  <a:srgbClr val="000000"/>
+                </a:solidFill>
+                <a:miter lim="800000"/>
+                <a:headEnd/>
+                <a:tailEnd/>
+              </a14:hiddenLine>
+            </a:ext>
+          </a:extLst>
+        </p:spPr>
+        <p:txBody>
+          <a:bodyPr/>
+          <a:lstStyle>
+            <a:lvl1pPr>
+              <a:lnSpc>
+                <a:spcPct val="120000"/>
+              </a:lnSpc>
+              <a:spcBef>
+                <a:spcPct val="20000"/>
+              </a:spcBef>
+              <a:spcAft>
+                <a:spcPct val="20000"/>
+              </a:spcAft>
+              <a:buClr>
+                <a:srgbClr val="990000"/>
+              </a:buClr>
+              <a:buSzPct val="85000"/>
+              <a:buFont typeface="Wingdings" panose="05000000000000000000" pitchFamily="2" charset="2"/>
+              <a:buChar char="l"/>
+              <a:defRPr sz="1700">
+                <a:solidFill>
+                  <a:schemeClr val="tx1"/>
+                </a:solidFill>
+                <a:latin typeface="FrutigerNext LT Medium" pitchFamily="34" charset="0"/>
+                <a:ea typeface="宋体" panose="02010600030101010101" pitchFamily="2" charset="-122"/>
+              </a:defRPr>
+            </a:lvl1pPr>
+            <a:lvl2pPr marL="742950" indent="-285750">
+              <a:lnSpc>
+                <a:spcPct val="120000"/>
+              </a:lnSpc>
+              <a:spcBef>
+                <a:spcPct val="20000"/>
+              </a:spcBef>
+              <a:spcAft>
+                <a:spcPct val="20000"/>
+              </a:spcAft>
+              <a:buClr>
+                <a:srgbClr val="5F5F5F"/>
+              </a:buClr>
+              <a:buFont typeface="Wingdings 3" panose="05040102010807070707" pitchFamily="18" charset="2"/>
+              <a:buChar char="["/>
+              <a:defRPr sz="1700">
+                <a:solidFill>
+                  <a:schemeClr val="tx1"/>
+                </a:solidFill>
+                <a:latin typeface="FrutigerNext LT Medium" pitchFamily="34" charset="0"/>
+                <a:ea typeface="宋体" panose="02010600030101010101" pitchFamily="2" charset="-122"/>
+              </a:defRPr>
+            </a:lvl2pPr>
+            <a:lvl3pPr marL="1143000" indent="-228600">
+              <a:lnSpc>
+                <a:spcPct val="120000"/>
+              </a:lnSpc>
+              <a:spcBef>
+                <a:spcPct val="20000"/>
+              </a:spcBef>
+              <a:spcAft>
+                <a:spcPct val="20000"/>
+              </a:spcAft>
+              <a:buClr>
+                <a:schemeClr val="tx1"/>
+              </a:buClr>
+              <a:buFont typeface="Arial" panose="020B0604020202020204" pitchFamily="34" charset="0"/>
+              <a:buChar char="−"/>
+              <a:defRPr sz="1700">
+                <a:solidFill>
+                  <a:schemeClr val="tx1"/>
+                </a:solidFill>
+                <a:latin typeface="FrutigerNext LT Medium" pitchFamily="34" charset="0"/>
+                <a:ea typeface="宋体" panose="02010600030101010101" pitchFamily="2" charset="-122"/>
+              </a:defRPr>
+            </a:lvl3pPr>
+            <a:lvl4pPr marL="1600200" indent="-228600">
+              <a:lnSpc>
+                <a:spcPct val="120000"/>
+              </a:lnSpc>
+              <a:spcBef>
+                <a:spcPct val="20000"/>
+              </a:spcBef>
+              <a:spcAft>
+                <a:spcPct val="20000"/>
+              </a:spcAft>
+              <a:buClr>
+                <a:schemeClr val="tx1"/>
+              </a:buClr>
+              <a:buFont typeface="Arial" panose="020B0604020202020204" pitchFamily="34" charset="0"/>
+              <a:buChar char="▪"/>
+              <a:defRPr sz="1700">
+                <a:solidFill>
+                  <a:schemeClr val="tx1"/>
+                </a:solidFill>
+                <a:latin typeface="FrutigerNext LT Medium" pitchFamily="34" charset="0"/>
+                <a:ea typeface="宋体" panose="02010600030101010101" pitchFamily="2" charset="-122"/>
+              </a:defRPr>
+            </a:lvl4pPr>
+            <a:lvl5pPr marL="2057400" indent="-228600">
+              <a:spcBef>
+                <a:spcPct val="20000"/>
+              </a:spcBef>
+              <a:buChar char="»"/>
+              <a:defRPr sz="1700">
+                <a:solidFill>
+                  <a:schemeClr val="tx1"/>
+                </a:solidFill>
+                <a:latin typeface="Arial" panose="020B0604020202020204" pitchFamily="34" charset="0"/>
+                <a:ea typeface="宋体" panose="02010600030101010101" pitchFamily="2" charset="-122"/>
+              </a:defRPr>
+            </a:lvl5pPr>
+            <a:lvl6pPr marL="2514600" indent="-228600" eaLnBrk="0" fontAlgn="base" hangingPunct="0">
+              <a:spcBef>
+                <a:spcPct val="20000"/>
+              </a:spcBef>
+              <a:spcAft>
+                <a:spcPct val="0"/>
+              </a:spcAft>
+              <a:buChar char="»"/>
+              <a:defRPr sz="1700">
+                <a:solidFill>
+                  <a:schemeClr val="tx1"/>
+                </a:solidFill>
+                <a:latin typeface="Arial" panose="020B0604020202020204" pitchFamily="34" charset="0"/>
+                <a:ea typeface="宋体" panose="02010600030101010101" pitchFamily="2" charset="-122"/>
+              </a:defRPr>
+            </a:lvl6pPr>
+            <a:lvl7pPr marL="2971800" indent="-228600" eaLnBrk="0" fontAlgn="base" hangingPunct="0">
+              <a:spcBef>
+                <a:spcPct val="20000"/>
+              </a:spcBef>
+              <a:spcAft>
+                <a:spcPct val="0"/>
+              </a:spcAft>
+              <a:buChar char="»"/>
+              <a:defRPr sz="1700">
+                <a:solidFill>
+                  <a:schemeClr val="tx1"/>
+                </a:solidFill>
+                <a:latin typeface="Arial" panose="020B0604020202020204" pitchFamily="34" charset="0"/>
+                <a:ea typeface="宋体" panose="02010600030101010101" pitchFamily="2" charset="-122"/>
+              </a:defRPr>
+            </a:lvl7pPr>
+            <a:lvl8pPr marL="3429000" indent="-228600" eaLnBrk="0" fontAlgn="base" hangingPunct="0">
+              <a:spcBef>
+                <a:spcPct val="20000"/>
+              </a:spcBef>
+              <a:spcAft>
+                <a:spcPct val="0"/>
+              </a:spcAft>
+              <a:buChar char="»"/>
+              <a:defRPr sz="1700">
+                <a:solidFill>
+                  <a:schemeClr val="tx1"/>
+                </a:solidFill>
+                <a:latin typeface="Arial" panose="020B0604020202020204" pitchFamily="34" charset="0"/>
+                <a:ea typeface="宋体" panose="02010600030101010101" pitchFamily="2" charset="-122"/>
+              </a:defRPr>
+            </a:lvl8pPr>
+            <a:lvl9pPr marL="3886200" indent="-228600" eaLnBrk="0" fontAlgn="base" hangingPunct="0">
+              <a:spcBef>
+                <a:spcPct val="20000"/>
+              </a:spcBef>
+              <a:spcAft>
+                <a:spcPct val="0"/>
+              </a:spcAft>
+              <a:buChar char="»"/>
+              <a:defRPr sz="1700">
+                <a:solidFill>
+                  <a:schemeClr val="tx1"/>
+                </a:solidFill>
+                <a:latin typeface="Arial" panose="020B0604020202020204" pitchFamily="34" charset="0"/>
+                <a:ea typeface="宋体" panose="02010600030101010101" pitchFamily="2" charset="-122"/>
+              </a:defRPr>
+            </a:lvl9pPr>
+          </a:lstStyle>
+          <a:p>
+            <a:pPr>
+              <a:lnSpc>
+                <a:spcPct val="85000"/>
+              </a:lnSpc>
+              <a:spcBef>
+                <a:spcPct val="0"/>
+              </a:spcBef>
+              <a:spcAft>
+                <a:spcPct val="0"/>
+              </a:spcAft>
+              <a:buClrTx/>
+              <a:buSzTx/>
+              <a:buFontTx/>
+              <a:buNone/>
+            </a:pPr>
+            <a:endParaRPr lang="de-DE" altLang="en-US" sz="1000" smtClean="0">
+              <a:ea typeface="MS PGothic" panose="020B0600070205080204" pitchFamily="34" charset="-128"/>
+            </a:endParaRPr>
+          </a:p>
+          <a:p>
+            <a:pPr>
+              <a:lnSpc>
+                <a:spcPct val="85000"/>
+              </a:lnSpc>
+              <a:spcBef>
+                <a:spcPct val="0"/>
+              </a:spcBef>
+              <a:spcAft>
+                <a:spcPct val="0"/>
+              </a:spcAft>
+              <a:buClrTx/>
+              <a:buSzTx/>
+              <a:buFontTx/>
+              <a:buNone/>
+            </a:pPr>
+            <a:r>
+              <a:rPr lang="de-DE" altLang="en-US" sz="1000" smtClean="0">
+                <a:ea typeface="MS PGothic" panose="020B0600070205080204" pitchFamily="34" charset="-128"/>
+              </a:rPr>
+              <a:t>Page </a:t>
+            </a:r>
+            <a:fld id="{86532620-EE16-4692-A7FF-47162C7E0C8F}" type="slidenum">
+              <a:rPr lang="de-DE" altLang="en-US" sz="1000" smtClean="0">
+                <a:ea typeface="MS PGothic" panose="020B0600070205080204" pitchFamily="34" charset="-128"/>
+              </a:rPr>
+              <a:pPr>
+                <a:lnSpc>
+                  <a:spcPct val="85000"/>
+                </a:lnSpc>
+                <a:spcBef>
+                  <a:spcPct val="0"/>
+                </a:spcBef>
+                <a:spcAft>
+                  <a:spcPct val="0"/>
+                </a:spcAft>
+                <a:buClrTx/>
+                <a:buSzTx/>
+                <a:buFontTx/>
+                <a:buNone/>
+              </a:pPr>
+              <a:t>26</a:t>
+            </a:fld>
+            <a:r>
+              <a:rPr lang="ru-RU" altLang="en-US" sz="1000" smtClean="0">
+                <a:ea typeface="MS PGothic" panose="020B0600070205080204" pitchFamily="34" charset="-128"/>
+              </a:rPr>
+              <a:t>/1</a:t>
+            </a:r>
+            <a:r>
+              <a:rPr lang="en-US" altLang="en-US" sz="1000" smtClean="0">
+                <a:ea typeface="MS PGothic" panose="020B0600070205080204" pitchFamily="34" charset="-128"/>
+              </a:rPr>
+              <a:t>3</a:t>
+            </a:r>
+            <a:endParaRPr lang="en-GB" altLang="en-US" sz="1000" smtClean="0">
+              <a:ea typeface="MS PGothic" panose="020B0600070205080204" pitchFamily="34" charset="-128"/>
+            </a:endParaRPr>
+          </a:p>
+        </p:txBody>
+      </p:sp>
+      <p:sp>
+        <p:nvSpPr>
+          <p:cNvPr id="4" name="Rectangle 3"/>
+          <p:cNvSpPr/>
+          <p:nvPr/>
+        </p:nvSpPr>
+        <p:spPr>
+          <a:xfrm>
+            <a:off x="5674518" y="914400"/>
+            <a:ext cx="1566863" cy="1066800"/>
+          </a:xfrm>
+          <a:prstGeom prst="rect">
+            <a:avLst/>
+          </a:prstGeom>
+        </p:spPr>
+        <p:style>
+          <a:lnRef idx="2">
+            <a:schemeClr val="dk1">
+              <a:shade val="50000"/>
+            </a:schemeClr>
+          </a:lnRef>
+          <a:fillRef idx="1">
+            <a:schemeClr val="dk1"/>
+          </a:fillRef>
+          <a:effectRef idx="0">
+            <a:schemeClr val="dk1"/>
+          </a:effectRef>
+          <a:fontRef idx="minor">
+            <a:schemeClr val="lt1"/>
+          </a:fontRef>
+        </p:style>
+        <p:txBody>
+          <a:bodyPr rtlCol="0" anchor="ctr"/>
+          <a:lstStyle/>
+          <a:p>
+            <a:pPr algn="ctr"/>
+            <a:r>
+              <a:rPr lang="en-US" dirty="0" smtClean="0"/>
+              <a:t>Multi million file code base</a:t>
+            </a:r>
+            <a:endParaRPr lang="en-US" dirty="0"/>
+          </a:p>
+        </p:txBody>
+      </p:sp>
+      <p:sp>
+        <p:nvSpPr>
+          <p:cNvPr id="2" name="TextBox 1"/>
+          <p:cNvSpPr txBox="1"/>
+          <p:nvPr/>
+        </p:nvSpPr>
+        <p:spPr>
+          <a:xfrm>
+            <a:off x="685800" y="914400"/>
+            <a:ext cx="1620957" cy="923330"/>
+          </a:xfrm>
+          <a:prstGeom prst="rect">
+            <a:avLst/>
+          </a:prstGeom>
+          <a:noFill/>
+        </p:spPr>
+        <p:txBody>
+          <a:bodyPr wrap="none" rtlCol="0">
+            <a:spAutoFit/>
+          </a:bodyPr>
+          <a:lstStyle/>
+          <a:p>
+            <a:r>
+              <a:rPr lang="en-US" dirty="0"/>
+              <a:t>t</a:t>
+            </a:r>
+            <a:r>
+              <a:rPr lang="en-US" dirty="0" smtClean="0"/>
+              <a:t>housands of</a:t>
+            </a:r>
+          </a:p>
+          <a:p>
+            <a:r>
+              <a:rPr lang="en-US" dirty="0"/>
+              <a:t>c</a:t>
+            </a:r>
+            <a:r>
+              <a:rPr lang="en-US" dirty="0" smtClean="0"/>
+              <a:t>rashes every</a:t>
+            </a:r>
+          </a:p>
+          <a:p>
+            <a:r>
+              <a:rPr lang="en-US" dirty="0" smtClean="0"/>
+              <a:t>day</a:t>
+            </a:r>
+            <a:endParaRPr lang="en-US" dirty="0"/>
+          </a:p>
+        </p:txBody>
+      </p:sp>
+      <p:cxnSp>
+        <p:nvCxnSpPr>
+          <p:cNvPr id="18" name="Straight Arrow Connector 17"/>
+          <p:cNvCxnSpPr/>
+          <p:nvPr/>
+        </p:nvCxnSpPr>
+        <p:spPr>
+          <a:xfrm>
+            <a:off x="2542837" y="1376065"/>
+            <a:ext cx="2867363" cy="0"/>
+          </a:xfrm>
+          <a:prstGeom prst="straightConnector1">
+            <a:avLst/>
+          </a:prstGeom>
+          <a:ln>
+            <a:tailEnd type="triangle"/>
+          </a:ln>
+        </p:spPr>
+        <p:style>
+          <a:lnRef idx="1">
+            <a:schemeClr val="dk1"/>
+          </a:lnRef>
+          <a:fillRef idx="0">
+            <a:schemeClr val="dk1"/>
+          </a:fillRef>
+          <a:effectRef idx="0">
+            <a:schemeClr val="dk1"/>
+          </a:effectRef>
+          <a:fontRef idx="minor">
+            <a:schemeClr val="tx1"/>
+          </a:fontRef>
+        </p:style>
+      </p:cxnSp>
+      <p:sp>
+        <p:nvSpPr>
+          <p:cNvPr id="22" name="TextBox 21"/>
+          <p:cNvSpPr txBox="1"/>
+          <p:nvPr/>
+        </p:nvSpPr>
+        <p:spPr>
+          <a:xfrm>
+            <a:off x="2743200" y="1376065"/>
+            <a:ext cx="2326278" cy="369332"/>
+          </a:xfrm>
+          <a:prstGeom prst="rect">
+            <a:avLst/>
+          </a:prstGeom>
+          <a:noFill/>
+        </p:spPr>
+        <p:txBody>
+          <a:bodyPr wrap="none" rtlCol="0">
+            <a:spAutoFit/>
+          </a:bodyPr>
+          <a:lstStyle/>
+          <a:p>
+            <a:r>
+              <a:rPr lang="en-US" dirty="0"/>
+              <a:t>w</a:t>
+            </a:r>
+            <a:r>
+              <a:rPr lang="en-US" dirty="0" smtClean="0"/>
+              <a:t>here to fix the bug?</a:t>
+            </a:r>
+            <a:endParaRPr lang="en-US" dirty="0"/>
+          </a:p>
+        </p:txBody>
+      </p:sp>
+    </p:spTree>
+    <p:extLst>
+      <p:ext uri="{BB962C8B-B14F-4D97-AF65-F5344CB8AC3E}">
+        <p14:creationId xmlns:p14="http://schemas.microsoft.com/office/powerpoint/2010/main" val="1204007245"/>
+      </p:ext>
+    </p:extLst>
+  </p:cSld>
+  <p:clrMapOvr>
+    <a:overrideClrMapping bg1="lt1" tx1="dk1" bg2="lt2" tx2="dk2" accent1="accent1" accent2="accent2" accent3="accent3" accent4="accent4" accent5="accent5" accent6="accent6" hlink="hlink" folHlink="folHlink"/>
+  </p:clrMapOvr>
+  <p:timing>
+    <p:tnLst>
+      <p:par>
+        <p:cTn id="1" dur="indefinite" restart="never" nodeType="tmRoot"/>
+      </p:par>
+    </p:tnLst>
+  </p:timing>
+</p:sld>
+</file>
+
+<file path=ppt/slides/slide27.xml><?xml version="1.0" encoding="utf-8"?>
+<p:sld xmlns:a="http://schemas.openxmlformats.org/drawingml/2006/main" xmlns:r="http://schemas.openxmlformats.org/officeDocument/2006/relationships" xmlns:p="http://schemas.openxmlformats.org/presentationml/2006/main">
+  <p:cSld>
+    <p:spTree>
+      <p:nvGrpSpPr>
+        <p:cNvPr id="1" name=""/>
+        <p:cNvGrpSpPr/>
+        <p:nvPr/>
+      </p:nvGrpSpPr>
+      <p:grpSpPr>
+        <a:xfrm>
+          <a:off x="0" y="0"/>
+          <a:ext cx="0" cy="0"/>
+          <a:chOff x="0" y="0"/>
+          <a:chExt cx="0" cy="0"/>
+        </a:xfrm>
+      </p:grpSpPr>
+    </p:spTree>
+  </p:cSld>
+  <p:clrMapOvr>
+    <a:masterClrMapping/>
+  </p:clrMapOvr>
+  <p:timing>
+    <p:tnLst>
+      <p:par>
+        <p:cTn id="1" dur="indefinite" restart="never" nodeType="tmRoot"/>
+      </p:par>
+    </p:tnLst>
+  </p:timing>
+</p:sld>
+</file>
+
+<file path=ppt/slides/slide28.xml><?xml version="1.0" encoding="utf-8"?>
+<p:sld xmlns:a="http://schemas.openxmlformats.org/drawingml/2006/main" xmlns:r="http://schemas.openxmlformats.org/officeDocument/2006/relationships" xmlns:p="http://schemas.openxmlformats.org/presentationml/2006/main">
+  <p:cSld>
+    <p:bg>
+      <p:bgPr>
+        <a:solidFill>
+          <a:schemeClr val="bg1"/>
+        </a:solidFill>
+        <a:effectLst/>
+      </p:bgPr>
+    </p:bg>
+    <p:spTree>
+      <p:nvGrpSpPr>
+        <p:cNvPr id="1" name=""/>
+        <p:cNvGrpSpPr/>
+        <p:nvPr/>
+      </p:nvGrpSpPr>
+      <p:grpSpPr>
+        <a:xfrm>
+          <a:off x="0" y="0"/>
+          <a:ext cx="0" cy="0"/>
+          <a:chOff x="0" y="0"/>
+          <a:chExt cx="0" cy="0"/>
+        </a:xfrm>
+      </p:grpSpPr>
+      <p:sp>
+        <p:nvSpPr>
+          <p:cNvPr id="11266" name="Rectangle 2"/>
+          <p:cNvSpPr>
+            <a:spLocks noGrp="1" noChangeArrowheads="1"/>
+          </p:cNvSpPr>
+          <p:nvPr>
+            <p:ph type="title"/>
+          </p:nvPr>
+        </p:nvSpPr>
+        <p:spPr>
+          <a:xfrm>
             <a:off x="609600" y="401638"/>
             <a:ext cx="8177213" cy="721210"/>
           </a:xfrm>
@@ -22368,7 +23371,7 @@
                 <a:buFontTx/>
                 <a:buNone/>
               </a:pPr>
-              <a:t>26</a:t>
+              <a:t>28</a:t>
             </a:fld>
             <a:r>
               <a:rPr lang="ru-RU" altLang="en-US" sz="1000" smtClean="0">
@@ -29203,6 +30206,49 @@
 </a:themeOverride>
 </file>
 
+<file path=ppt/theme/themeOverride20.xml><?xml version="1.0" encoding="utf-8"?>
+<a:themeOverride xmlns:a="http://schemas.openxmlformats.org/drawingml/2006/main">
+  <a:clrScheme name="Slide Template—English（20060512）  1">
+    <a:dk1>
+      <a:srgbClr val="000000"/>
+    </a:dk1>
+    <a:lt1>
+      <a:srgbClr val="FFFFFF"/>
+    </a:lt1>
+    <a:dk2>
+      <a:srgbClr val="000000"/>
+    </a:dk2>
+    <a:lt2>
+      <a:srgbClr val="808080"/>
+    </a:lt2>
+    <a:accent1>
+      <a:srgbClr val="BBE0E3"/>
+    </a:accent1>
+    <a:accent2>
+      <a:srgbClr val="333399"/>
+    </a:accent2>
+    <a:accent3>
+      <a:srgbClr val="FFFFFF"/>
+    </a:accent3>
+    <a:accent4>
+      <a:srgbClr val="000000"/>
+    </a:accent4>
+    <a:accent5>
+      <a:srgbClr val="DAEDEF"/>
+    </a:accent5>
+    <a:accent6>
+      <a:srgbClr val="2D2D8A"/>
+    </a:accent6>
+    <a:hlink>
+      <a:srgbClr val="009999"/>
+    </a:hlink>
+    <a:folHlink>
+      <a:srgbClr val="99CC00"/>
+    </a:folHlink>
+  </a:clrScheme>
+</a:themeOverride>
+</file>
+
 <file path=ppt/theme/themeOverride3.xml><?xml version="1.0" encoding="utf-8"?>
 <a:themeOverride xmlns:a="http://schemas.openxmlformats.org/drawingml/2006/main">
   <a:clrScheme name="Slide Template—English（20060512）  1">

</xml_diff>